<commit_message>
1 slide 2 go
</commit_message>
<xml_diff>
--- a/Entrega/22.99 TP2 G1.pptx
+++ b/Entrega/22.99 TP2 G1.pptx
@@ -16465,6 +16465,14 @@
 <file path=ppt/slides/slide13.xml><?xml version="1.0" encoding="utf-8"?>
 <p:sld xmlns:a="http://schemas.openxmlformats.org/drawingml/2006/main" xmlns:r="http://schemas.openxmlformats.org/officeDocument/2006/relationships" xmlns:p="http://schemas.openxmlformats.org/presentationml/2006/main">
   <p:cSld>
+    <p:bg>
+      <p:bgPr>
+        <a:solidFill>
+          <a:schemeClr val="bg1"/>
+        </a:solidFill>
+        <a:effectLst/>
+      </p:bgPr>
+    </p:bg>
     <p:spTree>
       <p:nvGrpSpPr>
         <p:cNvPr id="1" name=""/>
@@ -16497,80 +16505,16 @@
         </p:nvSpPr>
         <p:spPr/>
         <p:txBody>
-          <a:bodyPr/>
+          <a:bodyPr vert="horz" lIns="91440" tIns="45720" rIns="91440" bIns="45720" rtlCol="0" anchor="t">
+            <a:normAutofit/>
+          </a:bodyPr>
           <a:lstStyle/>
           <a:p>
             <a:r>
-              <a:rPr lang="es-ES" dirty="0"/>
-              <a:t>I</a:t>
-            </a:r>
-            <a:r>
-              <a:rPr lang="es-ES" baseline="30000" dirty="0"/>
-              <a:t>2</a:t>
-            </a:r>
-            <a:r>
-              <a:rPr lang="es-ES" dirty="0"/>
-              <a:t>C y </a:t>
-            </a:r>
-            <a:r>
-              <a:rPr lang="es-ES" dirty="0" err="1"/>
-              <a:t>SysTick</a:t>
+              <a:rPr lang="en-US" dirty="0" err="1"/>
+              <a:t>Interrupciones</a:t>
             </a:r>
             <a:endParaRPr lang="en-US" dirty="0"/>
-          </a:p>
-        </p:txBody>
-      </p:sp>
-      <p:pic>
-        <p:nvPicPr>
-          <p:cNvPr id="8" name="Content Placeholder 7" descr="A screenshot of a cell phone&#10;&#10;Description automatically generated">
-            <a:extLst>
-              <a:ext uri="{FF2B5EF4-FFF2-40B4-BE49-F238E27FC236}">
-                <a16:creationId xmlns:a16="http://schemas.microsoft.com/office/drawing/2014/main" id="{02383BE4-C7CE-47AB-85E7-2B8882D73173}"/>
-              </a:ext>
-            </a:extLst>
-          </p:cNvPr>
-          <p:cNvPicPr>
-            <a:picLocks noGrp="1" noChangeAspect="1"/>
-          </p:cNvPicPr>
-          <p:nvPr>
-            <p:ph sz="half" idx="1"/>
-          </p:nvPr>
-        </p:nvPicPr>
-        <p:blipFill>
-          <a:blip r:embed="rId2"/>
-          <a:stretch>
-            <a:fillRect/>
-          </a:stretch>
-        </p:blipFill>
-        <p:spPr>
-          <a:xfrm>
-            <a:off x="677863" y="3776225"/>
-            <a:ext cx="4183062" cy="650163"/>
-          </a:xfrm>
-        </p:spPr>
-      </p:pic>
-      <p:sp>
-        <p:nvSpPr>
-          <p:cNvPr id="4" name="Content Placeholder 3">
-            <a:extLst>
-              <a:ext uri="{FF2B5EF4-FFF2-40B4-BE49-F238E27FC236}">
-                <a16:creationId xmlns:a16="http://schemas.microsoft.com/office/drawing/2014/main" id="{8F516AD1-E2D8-4DDB-80A3-B8779D146336}"/>
-              </a:ext>
-            </a:extLst>
-          </p:cNvPr>
-          <p:cNvSpPr>
-            <a:spLocks noGrp="1"/>
-          </p:cNvSpPr>
-          <p:nvPr>
-            <p:ph sz="half" idx="2"/>
-          </p:nvPr>
-        </p:nvSpPr>
-        <p:spPr/>
-        <p:txBody>
-          <a:bodyPr/>
-          <a:lstStyle/>
-          <a:p>
-            <a:endParaRPr lang="en-US"/>
           </a:p>
         </p:txBody>
       </p:sp>
@@ -16592,14 +16536,29 @@
         </p:nvSpPr>
         <p:spPr/>
         <p:txBody>
-          <a:bodyPr/>
+          <a:bodyPr vert="horz" lIns="91440" tIns="45720" rIns="91440" bIns="45720" rtlCol="0" anchor="ctr">
+            <a:normAutofit/>
+          </a:bodyPr>
           <a:lstStyle/>
           <a:p>
-            <a:r>
-              <a:rPr lang="pt-BR"/>
+            <a:pPr defTabSz="914400">
+              <a:spcAft>
+                <a:spcPts val="600"/>
+              </a:spcAft>
+            </a:pPr>
+            <a:r>
+              <a:rPr lang="en-US" kern="1200">
+                <a:solidFill>
+                  <a:schemeClr val="tx1">
+                    <a:tint val="75000"/>
+                  </a:schemeClr>
+                </a:solidFill>
+                <a:latin typeface="+mn-lt"/>
+                <a:ea typeface="+mn-ea"/>
+                <a:cs typeface="+mn-cs"/>
+              </a:rPr>
               <a:t>Laboratorio de microprocesadores – TP2 - Grupo 1</a:t>
             </a:r>
-            <a:endParaRPr lang="en-US" dirty="0"/>
           </a:p>
         </p:txBody>
       </p:sp>
@@ -16621,14 +16580,214 @@
         </p:nvSpPr>
         <p:spPr/>
         <p:txBody>
-          <a:bodyPr/>
+          <a:bodyPr vert="horz" lIns="91440" tIns="45720" rIns="91440" bIns="45720" rtlCol="0" anchor="ctr">
+            <a:normAutofit/>
+          </a:bodyPr>
           <a:lstStyle/>
           <a:p>
+            <a:pPr defTabSz="914400">
+              <a:spcAft>
+                <a:spcPts val="600"/>
+              </a:spcAft>
+            </a:pPr>
             <a:fld id="{6FF9F0C5-380F-41C2-899A-BAC0F0927E16}" type="slidenum">
               <a:rPr lang="en-US" smtClean="0"/>
+              <a:pPr defTabSz="914400">
+                <a:spcAft>
+                  <a:spcPts val="600"/>
+                </a:spcAft>
+              </a:pPr>
               <a:t>13</a:t>
             </a:fld>
-            <a:endParaRPr lang="en-US" dirty="0"/>
+            <a:endParaRPr lang="en-US"/>
+          </a:p>
+        </p:txBody>
+      </p:sp>
+      <p:pic>
+        <p:nvPicPr>
+          <p:cNvPr id="45" name="Picture 44" descr="A picture containing screenshot, white, room&#10;&#10;Description automatically generated">
+            <a:extLst>
+              <a:ext uri="{FF2B5EF4-FFF2-40B4-BE49-F238E27FC236}">
+                <a16:creationId xmlns:a16="http://schemas.microsoft.com/office/drawing/2014/main" id="{5B63F05F-5C74-41A6-A6FD-1F67EA95FCE7}"/>
+              </a:ext>
+            </a:extLst>
+          </p:cNvPr>
+          <p:cNvPicPr>
+            <a:picLocks noChangeAspect="1"/>
+          </p:cNvPicPr>
+          <p:nvPr/>
+        </p:nvPicPr>
+        <p:blipFill>
+          <a:blip r:embed="rId2"/>
+          <a:stretch>
+            <a:fillRect/>
+          </a:stretch>
+        </p:blipFill>
+        <p:spPr>
+          <a:xfrm>
+            <a:off x="1205972" y="1930400"/>
+            <a:ext cx="9566804" cy="1932289"/>
+          </a:xfrm>
+          <a:prstGeom prst="rect">
+            <a:avLst/>
+          </a:prstGeom>
+          <a:ln>
+            <a:noFill/>
+          </a:ln>
+          <a:effectLst>
+            <a:outerShdw blurRad="292100" dist="139700" dir="2700000" algn="tl" rotWithShape="0">
+              <a:srgbClr val="333333">
+                <a:alpha val="65000"/>
+              </a:srgbClr>
+            </a:outerShdw>
+          </a:effectLst>
+        </p:spPr>
+      </p:pic>
+      <p:pic>
+        <p:nvPicPr>
+          <p:cNvPr id="47" name="Picture 46" descr="A screenshot of a cell phone&#10;&#10;Description automatically generated">
+            <a:extLst>
+              <a:ext uri="{FF2B5EF4-FFF2-40B4-BE49-F238E27FC236}">
+                <a16:creationId xmlns:a16="http://schemas.microsoft.com/office/drawing/2014/main" id="{2240FF95-99F3-4C89-BEA5-D783425CC37D}"/>
+              </a:ext>
+            </a:extLst>
+          </p:cNvPr>
+          <p:cNvPicPr>
+            <a:picLocks noChangeAspect="1"/>
+          </p:cNvPicPr>
+          <p:nvPr/>
+        </p:nvPicPr>
+        <p:blipFill>
+          <a:blip r:embed="rId3"/>
+          <a:stretch>
+            <a:fillRect/>
+          </a:stretch>
+        </p:blipFill>
+        <p:spPr>
+          <a:xfrm>
+            <a:off x="1205973" y="4075718"/>
+            <a:ext cx="9566804" cy="1944244"/>
+          </a:xfrm>
+          <a:prstGeom prst="rect">
+            <a:avLst/>
+          </a:prstGeom>
+          <a:ln>
+            <a:noFill/>
+          </a:ln>
+          <a:effectLst>
+            <a:outerShdw blurRad="292100" dist="139700" dir="2700000" algn="tl" rotWithShape="0">
+              <a:srgbClr val="333333">
+                <a:alpha val="65000"/>
+              </a:srgbClr>
+            </a:outerShdw>
+          </a:effectLst>
+        </p:spPr>
+      </p:pic>
+      <p:sp>
+        <p:nvSpPr>
+          <p:cNvPr id="48" name="TextBox 47">
+            <a:extLst>
+              <a:ext uri="{FF2B5EF4-FFF2-40B4-BE49-F238E27FC236}">
+                <a16:creationId xmlns:a16="http://schemas.microsoft.com/office/drawing/2014/main" id="{6F140761-F656-4687-9C2C-C8FEE1BE06E2}"/>
+              </a:ext>
+            </a:extLst>
+          </p:cNvPr>
+          <p:cNvSpPr txBox="1"/>
+          <p:nvPr/>
+        </p:nvSpPr>
+        <p:spPr>
+          <a:xfrm>
+            <a:off x="1025692" y="3616549"/>
+            <a:ext cx="1693445" cy="369332"/>
+          </a:xfrm>
+          <a:prstGeom prst="rect">
+            <a:avLst/>
+          </a:prstGeom>
+        </p:spPr>
+        <p:style>
+          <a:lnRef idx="3">
+            <a:schemeClr val="lt1"/>
+          </a:lnRef>
+          <a:fillRef idx="1">
+            <a:schemeClr val="accent2"/>
+          </a:fillRef>
+          <a:effectRef idx="1">
+            <a:schemeClr val="accent2"/>
+          </a:effectRef>
+          <a:fontRef idx="minor">
+            <a:schemeClr val="lt1"/>
+          </a:fontRef>
+        </p:style>
+        <p:txBody>
+          <a:bodyPr wrap="square" rtlCol="0">
+            <a:spAutoFit/>
+          </a:bodyPr>
+          <a:lstStyle/>
+          <a:p>
+            <a:r>
+              <a:rPr lang="en-US" dirty="0" err="1"/>
+              <a:t>SysTick</a:t>
+            </a:r>
+            <a:r>
+              <a:rPr lang="en-US" dirty="0"/>
+              <a:t>: 8.6us</a:t>
+            </a:r>
+          </a:p>
+        </p:txBody>
+      </p:sp>
+      <p:sp>
+        <p:nvSpPr>
+          <p:cNvPr id="49" name="TextBox 48">
+            <a:extLst>
+              <a:ext uri="{FF2B5EF4-FFF2-40B4-BE49-F238E27FC236}">
+                <a16:creationId xmlns:a16="http://schemas.microsoft.com/office/drawing/2014/main" id="{78F4DCDE-1756-48CD-9935-CB482F46963F}"/>
+              </a:ext>
+            </a:extLst>
+          </p:cNvPr>
+          <p:cNvSpPr txBox="1"/>
+          <p:nvPr/>
+        </p:nvSpPr>
+        <p:spPr>
+          <a:xfrm>
+            <a:off x="1025692" y="5672030"/>
+            <a:ext cx="1693445" cy="369332"/>
+          </a:xfrm>
+          <a:prstGeom prst="rect">
+            <a:avLst/>
+          </a:prstGeom>
+        </p:spPr>
+        <p:style>
+          <a:lnRef idx="3">
+            <a:schemeClr val="lt1"/>
+          </a:lnRef>
+          <a:fillRef idx="1">
+            <a:schemeClr val="accent2"/>
+          </a:fillRef>
+          <a:effectRef idx="1">
+            <a:schemeClr val="accent2"/>
+          </a:effectRef>
+          <a:fontRef idx="minor">
+            <a:schemeClr val="lt1"/>
+          </a:fontRef>
+        </p:style>
+        <p:txBody>
+          <a:bodyPr wrap="square" rtlCol="0">
+            <a:spAutoFit/>
+          </a:bodyPr>
+          <a:lstStyle/>
+          <a:p>
+            <a:r>
+              <a:rPr lang="en-US" dirty="0"/>
+              <a:t>I</a:t>
+            </a:r>
+            <a:r>
+              <a:rPr lang="en-US" baseline="30000" dirty="0"/>
+              <a:t>2</a:t>
+            </a:r>
+            <a:r>
+              <a:rPr lang="en-US" dirty="0"/>
+              <a:t>C: 9.0us</a:t>
+            </a:r>
           </a:p>
         </p:txBody>
       </p:sp>
@@ -16683,7 +16842,10 @@
           <a:bodyPr/>
           <a:lstStyle/>
           <a:p>
-            <a:endParaRPr lang="en-US"/>
+            <a:r>
+              <a:rPr lang="en-US" dirty="0"/>
+              <a:t>CAN</a:t>
+            </a:r>
           </a:p>
         </p:txBody>
       </p:sp>
@@ -16768,12 +16930,22 @@
         </p:blipFill>
         <p:spPr>
           <a:xfrm>
-            <a:off x="1235869" y="1905920"/>
+            <a:off x="1271964" y="1696119"/>
             <a:ext cx="8596312" cy="2289762"/>
           </a:xfrm>
           <a:prstGeom prst="rect">
             <a:avLst/>
           </a:prstGeom>
+          <a:ln>
+            <a:noFill/>
+          </a:ln>
+          <a:effectLst>
+            <a:outerShdw blurRad="292100" dist="139700" dir="2700000" algn="tl" rotWithShape="0">
+              <a:srgbClr val="333333">
+                <a:alpha val="65000"/>
+              </a:srgbClr>
+            </a:outerShdw>
+          </a:effectLst>
         </p:spPr>
       </p:pic>
       <p:pic>
@@ -16806,8 +16978,124 @@
           <a:prstGeom prst="rect">
             <a:avLst/>
           </a:prstGeom>
+          <a:ln>
+            <a:noFill/>
+          </a:ln>
+          <a:effectLst>
+            <a:outerShdw blurRad="292100" dist="139700" dir="2700000" algn="tl" rotWithShape="0">
+              <a:srgbClr val="333333">
+                <a:alpha val="65000"/>
+              </a:srgbClr>
+            </a:outerShdw>
+          </a:effectLst>
         </p:spPr>
       </p:pic>
+      <p:sp>
+        <p:nvSpPr>
+          <p:cNvPr id="8" name="TextBox 7">
+            <a:extLst>
+              <a:ext uri="{FF2B5EF4-FFF2-40B4-BE49-F238E27FC236}">
+                <a16:creationId xmlns:a16="http://schemas.microsoft.com/office/drawing/2014/main" id="{8DED4FCD-121B-4D1E-A5B4-A238781E4211}"/>
+              </a:ext>
+            </a:extLst>
+          </p:cNvPr>
+          <p:cNvSpPr txBox="1"/>
+          <p:nvPr/>
+        </p:nvSpPr>
+        <p:spPr>
+          <a:xfrm>
+            <a:off x="1025692" y="3616549"/>
+            <a:ext cx="4328361" cy="369332"/>
+          </a:xfrm>
+          <a:prstGeom prst="rect">
+            <a:avLst/>
+          </a:prstGeom>
+        </p:spPr>
+        <p:style>
+          <a:lnRef idx="3">
+            <a:schemeClr val="lt1"/>
+          </a:lnRef>
+          <a:fillRef idx="1">
+            <a:schemeClr val="accent2"/>
+          </a:fillRef>
+          <a:effectRef idx="1">
+            <a:schemeClr val="accent2"/>
+          </a:effectRef>
+          <a:fontRef idx="minor">
+            <a:schemeClr val="lt1"/>
+          </a:fontRef>
+        </p:style>
+        <p:txBody>
+          <a:bodyPr wrap="square" rtlCol="0">
+            <a:spAutoFit/>
+          </a:bodyPr>
+          <a:lstStyle/>
+          <a:p>
+            <a:r>
+              <a:rPr lang="es-ES" dirty="0"/>
+              <a:t>CAN: 101us</a:t>
+            </a:r>
+            <a:endParaRPr lang="en-US" dirty="0"/>
+          </a:p>
+        </p:txBody>
+      </p:sp>
+      <p:sp>
+        <p:nvSpPr>
+          <p:cNvPr id="9" name="TextBox 8">
+            <a:extLst>
+              <a:ext uri="{FF2B5EF4-FFF2-40B4-BE49-F238E27FC236}">
+                <a16:creationId xmlns:a16="http://schemas.microsoft.com/office/drawing/2014/main" id="{F0670AA2-51D5-4D88-9754-758DD5F0BAD6}"/>
+              </a:ext>
+            </a:extLst>
+          </p:cNvPr>
+          <p:cNvSpPr txBox="1"/>
+          <p:nvPr/>
+        </p:nvSpPr>
+        <p:spPr>
+          <a:xfrm>
+            <a:off x="1025692" y="5834370"/>
+            <a:ext cx="4328361" cy="369332"/>
+          </a:xfrm>
+          <a:prstGeom prst="rect">
+            <a:avLst/>
+          </a:prstGeom>
+        </p:spPr>
+        <p:style>
+          <a:lnRef idx="3">
+            <a:schemeClr val="lt1"/>
+          </a:lnRef>
+          <a:fillRef idx="1">
+            <a:schemeClr val="accent2"/>
+          </a:fillRef>
+          <a:effectRef idx="1">
+            <a:schemeClr val="accent2"/>
+          </a:effectRef>
+          <a:fontRef idx="minor">
+            <a:schemeClr val="lt1"/>
+          </a:fontRef>
+        </p:style>
+        <p:txBody>
+          <a:bodyPr wrap="square" rtlCol="0">
+            <a:spAutoFit/>
+          </a:bodyPr>
+          <a:lstStyle/>
+          <a:p>
+            <a:r>
+              <a:rPr lang="en-US" dirty="0" err="1"/>
+              <a:t>Interrupci</a:t>
+            </a:r>
+            <a:r>
+              <a:rPr lang="es-ES" dirty="0" err="1"/>
+              <a:t>ón</a:t>
+            </a:r>
+            <a:r>
+              <a:rPr lang="es-ES" dirty="0"/>
+              <a:t> admite más interrupciones</a:t>
+            </a:r>
+            <a:endParaRPr lang="en-US" dirty="0"/>
+          </a:p>
+        </p:txBody>
+      </p:sp>
     </p:spTree>
     <p:extLst>
       <p:ext uri="{BB962C8B-B14F-4D97-AF65-F5344CB8AC3E}">
@@ -21305,15 +21593,6 @@
 </file>
 
 <file path=customXml/item2.xml><?xml version="1.0" encoding="utf-8"?>
-<?mso-contentType ?>
-<FormTemplates xmlns="http://schemas.microsoft.com/sharepoint/v3/contenttype/forms">
-  <Display>DocumentLibraryForm</Display>
-  <Edit>DocumentLibraryForm</Edit>
-  <New>DocumentLibraryForm</New>
-</FormTemplates>
-</file>
-
-<file path=customXml/item3.xml><?xml version="1.0" encoding="utf-8"?>
 <ct:contentTypeSchema xmlns:ct="http://schemas.microsoft.com/office/2006/metadata/contentType" xmlns:ma="http://schemas.microsoft.com/office/2006/metadata/properties/metaAttributes" ct:_="" ma:_="" ma:contentTypeName="Documento" ma:contentTypeID="0x010100D3ACF04A7F9B864F984482D74838982E" ma:contentTypeVersion="2" ma:contentTypeDescription="Crear nuevo documento." ma:contentTypeScope="" ma:versionID="46a6908ee1857d062a054b6f801a1a59">
   <xsd:schema xmlns:xsd="http://www.w3.org/2001/XMLSchema" xmlns:xs="http://www.w3.org/2001/XMLSchema" xmlns:p="http://schemas.microsoft.com/office/2006/metadata/properties" xmlns:ns3="eb33805b-88a9-40a3-8f3b-568156ed15a3" targetNamespace="http://schemas.microsoft.com/office/2006/metadata/properties" ma:root="true" ma:fieldsID="439506ca6a2c3ed63ca6ef35b0e219d5" ns3:_="">
     <xsd:import namespace="eb33805b-88a9-40a3-8f3b-568156ed15a3"/>
@@ -21445,31 +21724,32 @@
 </ct:contentTypeSchema>
 </file>
 
+<file path=customXml/item3.xml><?xml version="1.0" encoding="utf-8"?>
+<?mso-contentType ?>
+<FormTemplates xmlns="http://schemas.microsoft.com/sharepoint/v3/contenttype/forms">
+  <Display>DocumentLibraryForm</Display>
+  <Edit>DocumentLibraryForm</Edit>
+  <New>DocumentLibraryForm</New>
+</FormTemplates>
+</file>
+
 <file path=customXml/itemProps1.xml><?xml version="1.0" encoding="utf-8"?>
 <ds:datastoreItem xmlns:ds="http://schemas.openxmlformats.org/officeDocument/2006/customXml" ds:itemID="{D9461C74-94E2-411A-89D9-B8158C81BB5E}">
   <ds:schemaRefs>
-    <ds:schemaRef ds:uri="http://purl.org/dc/elements/1.1/"/>
+    <ds:schemaRef ds:uri="http://schemas.microsoft.com/office/2006/metadata/properties"/>
     <ds:schemaRef ds:uri="http://schemas.microsoft.com/office/2006/documentManagement/types"/>
     <ds:schemaRef ds:uri="eb33805b-88a9-40a3-8f3b-568156ed15a3"/>
-    <ds:schemaRef ds:uri="http://purl.org/dc/dcmitype/"/>
-    <ds:schemaRef ds:uri="http://schemas.microsoft.com/office/2006/metadata/properties"/>
+    <ds:schemaRef ds:uri="http://www.w3.org/XML/1998/namespace"/>
+    <ds:schemaRef ds:uri="http://purl.org/dc/terms/"/>
+    <ds:schemaRef ds:uri="http://purl.org/dc/elements/1.1/"/>
     <ds:schemaRef ds:uri="http://schemas.microsoft.com/office/infopath/2007/PartnerControls"/>
     <ds:schemaRef ds:uri="http://schemas.openxmlformats.org/package/2006/metadata/core-properties"/>
-    <ds:schemaRef ds:uri="http://www.w3.org/XML/1998/namespace"/>
-    <ds:schemaRef ds:uri="http://purl.org/dc/terms/"/>
+    <ds:schemaRef ds:uri="http://purl.org/dc/dcmitype/"/>
   </ds:schemaRefs>
 </ds:datastoreItem>
 </file>
 
 <file path=customXml/itemProps2.xml><?xml version="1.0" encoding="utf-8"?>
-<ds:datastoreItem xmlns:ds="http://schemas.openxmlformats.org/officeDocument/2006/customXml" ds:itemID="{E02D8953-537A-4FBD-B24D-DDF016785B1A}">
-  <ds:schemaRefs>
-    <ds:schemaRef ds:uri="http://schemas.microsoft.com/sharepoint/v3/contenttype/forms"/>
-  </ds:schemaRefs>
-</ds:datastoreItem>
-</file>
-
-<file path=customXml/itemProps3.xml><?xml version="1.0" encoding="utf-8"?>
 <ds:datastoreItem xmlns:ds="http://schemas.openxmlformats.org/officeDocument/2006/customXml" ds:itemID="{432DD584-F378-4055-9B94-3829DB515B2E}">
   <ds:schemaRefs>
     <ds:schemaRef ds:uri="http://schemas.microsoft.com/office/2006/metadata/contentType"/>
@@ -21485,4 +21765,12 @@
     <ds:schemaRef ds:uri="http://schemas.microsoft.com/internal/obd"/>
   </ds:schemaRefs>
 </ds:datastoreItem>
+</file>
+
+<file path=customXml/itemProps3.xml><?xml version="1.0" encoding="utf-8"?>
+<ds:datastoreItem xmlns:ds="http://schemas.openxmlformats.org/officeDocument/2006/customXml" ds:itemID="{E02D8953-537A-4FBD-B24D-DDF016785B1A}">
+  <ds:schemaRefs>
+    <ds:schemaRef ds:uri="http://schemas.microsoft.com/sharepoint/v3/contenttype/forms"/>
+  </ds:schemaRefs>
+</ds:datastoreItem>
 </file>
</xml_diff>